<commit_message>
Revising tables to improve readability
</commit_message>
<xml_diff>
--- a/table1_3.pptx
+++ b/table1_3.pptx
@@ -3137,7 +3137,7 @@
                           <a:spcPct val="100000"/>
                         </a:lnSpc>
                       </a:pPr>
-                      <a:endParaRPr lang="en-US" sz="1000">
+                      <a:endParaRPr lang="en-US" sz="1000" dirty="0">
                         <a:effectLst/>
                         <a:latin typeface="Calibri" panose="020F0502020204030204" pitchFamily="34" charset="0"/>
                         <a:cs typeface="Times New Roman" panose="02020603050405020304" pitchFamily="18" charset="0"/>
@@ -4174,7 +4174,7 @@
                         </a:spcAft>
                       </a:pPr>
                       <a:r>
-                        <a:rPr lang="en-US" sz="1000">
+                        <a:rPr lang="en-US" sz="1000" dirty="0">
                           <a:solidFill>
                             <a:srgbClr val="000000"/>
                           </a:solidFill>
@@ -4183,9 +4183,9 @@
                           <a:ea typeface="Calibri" panose="020F0502020204030204" pitchFamily="34" charset="0"/>
                           <a:cs typeface="Times New Roman" panose="02020603050405020304" pitchFamily="18" charset="0"/>
                         </a:rPr>
-                        <a:t>1·42</a:t>
+                        <a:t>1.42</a:t>
                       </a:r>
-                      <a:endParaRPr lang="en-US" sz="1000">
+                      <a:endParaRPr lang="en-US" sz="1000" dirty="0">
                         <a:effectLst/>
                         <a:latin typeface="Times New Roman" panose="02020603050405020304" pitchFamily="18" charset="0"/>
                         <a:ea typeface="Calibri" panose="020F0502020204030204" pitchFamily="34" charset="0"/>
@@ -4231,7 +4231,7 @@
                         </a:spcAft>
                       </a:pPr>
                       <a:r>
-                        <a:rPr lang="en-US" sz="1000">
+                        <a:rPr lang="en-US" sz="1000" dirty="0">
                           <a:solidFill>
                             <a:srgbClr val="000000"/>
                           </a:solidFill>
@@ -4240,9 +4240,9 @@
                           <a:ea typeface="Calibri" panose="020F0502020204030204" pitchFamily="34" charset="0"/>
                           <a:cs typeface="Times New Roman" panose="02020603050405020304" pitchFamily="18" charset="0"/>
                         </a:rPr>
-                        <a:t>1·06</a:t>
+                        <a:t>1.06</a:t>
                       </a:r>
-                      <a:endParaRPr lang="en-US" sz="1000">
+                      <a:endParaRPr lang="en-US" sz="1000" dirty="0">
                         <a:effectLst/>
                         <a:latin typeface="Times New Roman" panose="02020603050405020304" pitchFamily="18" charset="0"/>
                         <a:ea typeface="Calibri" panose="020F0502020204030204" pitchFamily="34" charset="0"/>
@@ -4297,7 +4297,7 @@
                           <a:ea typeface="Calibri" panose="020F0502020204030204" pitchFamily="34" charset="0"/>
                           <a:cs typeface="Times New Roman" panose="02020603050405020304" pitchFamily="18" charset="0"/>
                         </a:rPr>
-                        <a:t>1·85</a:t>
+                        <a:t>1.85</a:t>
                       </a:r>
                       <a:endParaRPr lang="en-US" sz="1000" dirty="0">
                         <a:effectLst/>
@@ -4383,7 +4383,7 @@
                         </a:spcAft>
                       </a:pPr>
                       <a:r>
-                        <a:rPr lang="en-US" sz="1000">
+                        <a:rPr lang="en-US" sz="1000" dirty="0">
                           <a:solidFill>
                             <a:srgbClr val="000000"/>
                           </a:solidFill>
@@ -4392,9 +4392,9 @@
                           <a:ea typeface="Calibri" panose="020F0502020204030204" pitchFamily="34" charset="0"/>
                           <a:cs typeface="Times New Roman" panose="02020603050405020304" pitchFamily="18" charset="0"/>
                         </a:rPr>
-                        <a:t>3·64</a:t>
+                        <a:t>3.64</a:t>
                       </a:r>
-                      <a:endParaRPr lang="en-US" sz="1000">
+                      <a:endParaRPr lang="en-US" sz="1000" dirty="0">
                         <a:effectLst/>
                         <a:latin typeface="Times New Roman" panose="02020603050405020304" pitchFamily="18" charset="0"/>
                         <a:ea typeface="Calibri" panose="020F0502020204030204" pitchFamily="34" charset="0"/>
@@ -4449,7 +4449,7 @@
                           <a:ea typeface="Calibri" panose="020F0502020204030204" pitchFamily="34" charset="0"/>
                           <a:cs typeface="Times New Roman" panose="02020603050405020304" pitchFamily="18" charset="0"/>
                         </a:rPr>
-                        <a:t>2·25</a:t>
+                        <a:t>2.25</a:t>
                       </a:r>
                       <a:endParaRPr lang="en-US" sz="1000" dirty="0">
                         <a:effectLst/>
@@ -4497,7 +4497,7 @@
                         </a:spcAft>
                       </a:pPr>
                       <a:r>
-                        <a:rPr lang="en-US" sz="1000">
+                        <a:rPr lang="en-US" sz="1000" dirty="0">
                           <a:solidFill>
                             <a:srgbClr val="000000"/>
                           </a:solidFill>
@@ -4506,9 +4506,9 @@
                           <a:ea typeface="Calibri" panose="020F0502020204030204" pitchFamily="34" charset="0"/>
                           <a:cs typeface="Times New Roman" panose="02020603050405020304" pitchFamily="18" charset="0"/>
                         </a:rPr>
-                        <a:t>5·73</a:t>
+                        <a:t>5.73</a:t>
                       </a:r>
-                      <a:endParaRPr lang="en-US" sz="1000">
+                      <a:endParaRPr lang="en-US" sz="1000" dirty="0">
                         <a:effectLst/>
                         <a:latin typeface="Times New Roman" panose="02020603050405020304" pitchFamily="18" charset="0"/>
                         <a:ea typeface="Calibri" panose="020F0502020204030204" pitchFamily="34" charset="0"/>
@@ -4601,7 +4601,7 @@
                           <a:ea typeface="Calibri" panose="020F0502020204030204" pitchFamily="34" charset="0"/>
                           <a:cs typeface="Times New Roman" panose="02020603050405020304" pitchFamily="18" charset="0"/>
                         </a:rPr>
-                        <a:t>4·74</a:t>
+                        <a:t>4.74</a:t>
                       </a:r>
                       <a:endParaRPr lang="en-US" sz="1000" dirty="0">
                         <a:effectLst/>
@@ -4658,7 +4658,7 @@
                           <a:ea typeface="Calibri" panose="020F0502020204030204" pitchFamily="34" charset="0"/>
                           <a:cs typeface="Times New Roman" panose="02020603050405020304" pitchFamily="18" charset="0"/>
                         </a:rPr>
-                        <a:t>3·14</a:t>
+                        <a:t>3.14</a:t>
                       </a:r>
                       <a:endParaRPr lang="en-US" sz="1000" dirty="0">
                         <a:effectLst/>
@@ -4715,7 +4715,7 @@
                           <a:ea typeface="Calibri" panose="020F0502020204030204" pitchFamily="34" charset="0"/>
                           <a:cs typeface="Times New Roman" panose="02020603050405020304" pitchFamily="18" charset="0"/>
                         </a:rPr>
-                        <a:t>6·90 </a:t>
+                        <a:t>6.90 </a:t>
                       </a:r>
                       <a:endParaRPr lang="en-US" sz="1000" dirty="0">
                         <a:effectLst/>
@@ -4818,7 +4818,7 @@
                         </a:spcAft>
                       </a:pPr>
                       <a:r>
-                        <a:rPr lang="en-US" sz="1000">
+                        <a:rPr lang="en-US" sz="1000" dirty="0">
                           <a:solidFill>
                             <a:srgbClr val="000000"/>
                           </a:solidFill>
@@ -4827,9 +4827,9 @@
                           <a:ea typeface="Calibri" panose="020F0502020204030204" pitchFamily="34" charset="0"/>
                           <a:cs typeface="Times New Roman" panose="02020603050405020304" pitchFamily="18" charset="0"/>
                         </a:rPr>
-                        <a:t>4·27</a:t>
+                        <a:t>4.27</a:t>
                       </a:r>
-                      <a:endParaRPr lang="en-US" sz="1000">
+                      <a:endParaRPr lang="en-US" sz="1000" dirty="0">
                         <a:effectLst/>
                         <a:latin typeface="Times New Roman" panose="02020603050405020304" pitchFamily="18" charset="0"/>
                         <a:ea typeface="Calibri" panose="020F0502020204030204" pitchFamily="34" charset="0"/>
@@ -4875,7 +4875,7 @@
                         </a:spcAft>
                       </a:pPr>
                       <a:r>
-                        <a:rPr lang="en-US" sz="1000">
+                        <a:rPr lang="en-US" sz="1000" dirty="0">
                           <a:solidFill>
                             <a:srgbClr val="000000"/>
                           </a:solidFill>
@@ -4884,9 +4884,9 @@
                           <a:ea typeface="Calibri" panose="020F0502020204030204" pitchFamily="34" charset="0"/>
                           <a:cs typeface="Times New Roman" panose="02020603050405020304" pitchFamily="18" charset="0"/>
                         </a:rPr>
-                        <a:t>3·17</a:t>
+                        <a:t>3.17</a:t>
                       </a:r>
-                      <a:endParaRPr lang="en-US" sz="1000">
+                      <a:endParaRPr lang="en-US" sz="1000" dirty="0">
                         <a:effectLst/>
                         <a:latin typeface="Times New Roman" panose="02020603050405020304" pitchFamily="18" charset="0"/>
                         <a:ea typeface="Calibri" panose="020F0502020204030204" pitchFamily="34" charset="0"/>
@@ -4932,7 +4932,7 @@
                         </a:spcAft>
                       </a:pPr>
                       <a:r>
-                        <a:rPr lang="en-US" sz="1000">
+                        <a:rPr lang="en-US" sz="1000" dirty="0">
                           <a:solidFill>
                             <a:srgbClr val="000000"/>
                           </a:solidFill>
@@ -4941,9 +4941,9 @@
                           <a:ea typeface="Calibri" panose="020F0502020204030204" pitchFamily="34" charset="0"/>
                           <a:cs typeface="Times New Roman" panose="02020603050405020304" pitchFamily="18" charset="0"/>
                         </a:rPr>
-                        <a:t>5·55</a:t>
+                        <a:t>5.55</a:t>
                       </a:r>
-                      <a:endParaRPr lang="en-US" sz="1000">
+                      <a:endParaRPr lang="en-US" sz="1000" dirty="0">
                         <a:effectLst/>
                         <a:latin typeface="Times New Roman" panose="02020603050405020304" pitchFamily="18" charset="0"/>
                         <a:ea typeface="Calibri" panose="020F0502020204030204" pitchFamily="34" charset="0"/>
@@ -5055,7 +5055,7 @@
                           <a:ea typeface="Calibri" panose="020F0502020204030204" pitchFamily="34" charset="0"/>
                           <a:cs typeface="Times New Roman" panose="02020603050405020304" pitchFamily="18" charset="0"/>
                         </a:rPr>
-                        <a:t>10·93</a:t>
+                        <a:t>10.93</a:t>
                       </a:r>
                       <a:endParaRPr lang="en-US" sz="1000" dirty="0">
                         <a:effectLst/>
@@ -5112,7 +5112,7 @@
                           <a:ea typeface="Calibri" panose="020F0502020204030204" pitchFamily="34" charset="0"/>
                           <a:cs typeface="Times New Roman" panose="02020603050405020304" pitchFamily="18" charset="0"/>
                         </a:rPr>
-                        <a:t>6·76</a:t>
+                        <a:t>6.76</a:t>
                       </a:r>
                       <a:endParaRPr lang="en-US" sz="1000" dirty="0">
                         <a:effectLst/>
@@ -5160,7 +5160,7 @@
                         </a:spcAft>
                       </a:pPr>
                       <a:r>
-                        <a:rPr lang="en-US" sz="1000">
+                        <a:rPr lang="en-US" sz="1000" dirty="0">
                           <a:solidFill>
                             <a:srgbClr val="000000"/>
                           </a:solidFill>
@@ -5169,9 +5169,9 @@
                           <a:ea typeface="Calibri" panose="020F0502020204030204" pitchFamily="34" charset="0"/>
                           <a:cs typeface="Times New Roman" panose="02020603050405020304" pitchFamily="18" charset="0"/>
                         </a:rPr>
-                        <a:t>17·20 </a:t>
+                        <a:t>17.20 </a:t>
                       </a:r>
-                      <a:endParaRPr lang="en-US" sz="1000">
+                      <a:endParaRPr lang="en-US" sz="1000" dirty="0">
                         <a:effectLst/>
                         <a:latin typeface="Times New Roman" panose="02020603050405020304" pitchFamily="18" charset="0"/>
                         <a:ea typeface="Calibri" panose="020F0502020204030204" pitchFamily="34" charset="0"/>
@@ -5274,7 +5274,7 @@
                         </a:spcAft>
                       </a:pPr>
                       <a:r>
-                        <a:rPr lang="en-US" sz="1000">
+                        <a:rPr lang="en-US" sz="1000" dirty="0">
                           <a:solidFill>
                             <a:srgbClr val="000000"/>
                           </a:solidFill>
@@ -5283,9 +5283,9 @@
                           <a:ea typeface="Calibri" panose="020F0502020204030204" pitchFamily="34" charset="0"/>
                           <a:cs typeface="Times New Roman" panose="02020603050405020304" pitchFamily="18" charset="0"/>
                         </a:rPr>
-                        <a:t>14·22</a:t>
+                        <a:t>14.22</a:t>
                       </a:r>
-                      <a:endParaRPr lang="en-US" sz="1000">
+                      <a:endParaRPr lang="en-US" sz="1000" dirty="0">
                         <a:effectLst/>
                         <a:latin typeface="Times New Roman" panose="02020603050405020304" pitchFamily="18" charset="0"/>
                         <a:ea typeface="Calibri" panose="020F0502020204030204" pitchFamily="34" charset="0"/>
@@ -5331,7 +5331,7 @@
                         </a:spcAft>
                       </a:pPr>
                       <a:r>
-                        <a:rPr lang="en-US" sz="1000">
+                        <a:rPr lang="en-US" sz="1000" dirty="0">
                           <a:solidFill>
                             <a:srgbClr val="000000"/>
                           </a:solidFill>
@@ -5340,9 +5340,9 @@
                           <a:ea typeface="Calibri" panose="020F0502020204030204" pitchFamily="34" charset="0"/>
                           <a:cs typeface="Times New Roman" panose="02020603050405020304" pitchFamily="18" charset="0"/>
                         </a:rPr>
-                        <a:t>9·42</a:t>
+                        <a:t>9.42</a:t>
                       </a:r>
-                      <a:endParaRPr lang="en-US" sz="1000">
+                      <a:endParaRPr lang="en-US" sz="1000" dirty="0">
                         <a:effectLst/>
                         <a:latin typeface="Times New Roman" panose="02020603050405020304" pitchFamily="18" charset="0"/>
                         <a:ea typeface="Calibri" panose="020F0502020204030204" pitchFamily="34" charset="0"/>
@@ -5397,7 +5397,7 @@
                           <a:ea typeface="Calibri" panose="020F0502020204030204" pitchFamily="34" charset="0"/>
                           <a:cs typeface="Times New Roman" panose="02020603050405020304" pitchFamily="18" charset="0"/>
                         </a:rPr>
-                        <a:t>20·71</a:t>
+                        <a:t>20.71</a:t>
                       </a:r>
                       <a:endParaRPr lang="en-US" sz="1000" dirty="0">
                         <a:effectLst/>

</xml_diff>